<commit_message>
Andoid work around for missing dynamically loaded assets
</commit_message>
<xml_diff>
--- a/Art/StartPageMockup.pptx
+++ b/Art/StartPageMockup.pptx
@@ -5,14 +5,15 @@
     <p:sldMasterId id="2147483648" r:id="rId1"/>
   </p:sldMasterIdLst>
   <p:notesMasterIdLst>
-    <p:notesMasterId r:id="rId7"/>
+    <p:notesMasterId r:id="rId8"/>
   </p:notesMasterIdLst>
   <p:sldIdLst>
     <p:sldId id="256" r:id="rId2"/>
     <p:sldId id="257" r:id="rId3"/>
     <p:sldId id="258" r:id="rId4"/>
     <p:sldId id="260" r:id="rId5"/>
-    <p:sldId id="259" r:id="rId6"/>
+    <p:sldId id="261" r:id="rId6"/>
+    <p:sldId id="259" r:id="rId7"/>
   </p:sldIdLst>
   <p:sldSz cx="12192000" cy="6858000"/>
   <p:notesSz cx="6858000" cy="9144000"/>
@@ -205,7 +206,7 @@
           <a:p>
             <a:fld id="{E68376E5-8BF7-419C-8A6A-DA0D4191CD89}" type="datetimeFigureOut">
               <a:rPr lang="en-US" smtClean="0"/>
-              <a:t>12/19/2017</a:t>
+              <a:t>1/25/2018</a:t>
             </a:fld>
             <a:endParaRPr lang="en-US"/>
           </a:p>
@@ -882,6 +883,90 @@
     </p:spTree>
     <p:extLst>
       <p:ext uri="{BB962C8B-B14F-4D97-AF65-F5344CB8AC3E}">
+        <p14:creationId xmlns:p14="http://schemas.microsoft.com/office/powerpoint/2010/main" val="1502880736"/>
+      </p:ext>
+    </p:extLst>
+  </p:cSld>
+  <p:clrMapOvr>
+    <a:masterClrMapping/>
+  </p:clrMapOvr>
+</p:notes>
+</file>
+
+<file path=ppt/notesSlides/notesSlide6.xml><?xml version="1.0" encoding="utf-8"?>
+<p:notes xmlns:a="http://schemas.openxmlformats.org/drawingml/2006/main" xmlns:r="http://schemas.openxmlformats.org/officeDocument/2006/relationships" xmlns:p="http://schemas.openxmlformats.org/presentationml/2006/main">
+  <p:cSld>
+    <p:spTree>
+      <p:nvGrpSpPr>
+        <p:cNvPr id="1" name=""/>
+        <p:cNvGrpSpPr/>
+        <p:nvPr/>
+      </p:nvGrpSpPr>
+      <p:grpSpPr>
+        <a:xfrm>
+          <a:off x="0" y="0"/>
+          <a:ext cx="0" cy="0"/>
+          <a:chOff x="0" y="0"/>
+          <a:chExt cx="0" cy="0"/>
+        </a:xfrm>
+      </p:grpSpPr>
+      <p:sp>
+        <p:nvSpPr>
+          <p:cNvPr id="2" name="Slide Image Placeholder 1"/>
+          <p:cNvSpPr>
+            <a:spLocks noGrp="1" noRot="1" noChangeAspect="1"/>
+          </p:cNvSpPr>
+          <p:nvPr>
+            <p:ph type="sldImg"/>
+          </p:nvPr>
+        </p:nvSpPr>
+        <p:spPr/>
+      </p:sp>
+      <p:sp>
+        <p:nvSpPr>
+          <p:cNvPr id="3" name="Notes Placeholder 2"/>
+          <p:cNvSpPr>
+            <a:spLocks noGrp="1"/>
+          </p:cNvSpPr>
+          <p:nvPr>
+            <p:ph type="body" idx="1"/>
+          </p:nvPr>
+        </p:nvSpPr>
+        <p:spPr/>
+        <p:txBody>
+          <a:bodyPr/>
+          <a:lstStyle/>
+          <a:p>
+            <a:endParaRPr lang="en-US"/>
+          </a:p>
+        </p:txBody>
+      </p:sp>
+      <p:sp>
+        <p:nvSpPr>
+          <p:cNvPr id="4" name="Slide Number Placeholder 3"/>
+          <p:cNvSpPr>
+            <a:spLocks noGrp="1"/>
+          </p:cNvSpPr>
+          <p:nvPr>
+            <p:ph type="sldNum" sz="quarter" idx="10"/>
+          </p:nvPr>
+        </p:nvSpPr>
+        <p:spPr/>
+        <p:txBody>
+          <a:bodyPr/>
+          <a:lstStyle/>
+          <a:p>
+            <a:fld id="{7A0BE228-525B-46CA-9B2A-D6891A552F95}" type="slidenum">
+              <a:rPr lang="en-US" smtClean="0"/>
+              <a:t>6</a:t>
+            </a:fld>
+            <a:endParaRPr lang="en-US"/>
+          </a:p>
+        </p:txBody>
+      </p:sp>
+    </p:spTree>
+    <p:extLst>
+      <p:ext uri="{BB962C8B-B14F-4D97-AF65-F5344CB8AC3E}">
         <p14:creationId xmlns:p14="http://schemas.microsoft.com/office/powerpoint/2010/main" val="741842877"/>
       </p:ext>
     </p:extLst>
@@ -1039,7 +1124,7 @@
           <a:p>
             <a:fld id="{D4E819DD-013E-4DBF-AC13-153FC4836066}" type="datetimeFigureOut">
               <a:rPr lang="en-US" smtClean="0"/>
-              <a:t>12/19/2017</a:t>
+              <a:t>1/25/2018</a:t>
             </a:fld>
             <a:endParaRPr lang="en-US"/>
           </a:p>
@@ -1237,7 +1322,7 @@
           <a:p>
             <a:fld id="{D4E819DD-013E-4DBF-AC13-153FC4836066}" type="datetimeFigureOut">
               <a:rPr lang="en-US" smtClean="0"/>
-              <a:t>12/19/2017</a:t>
+              <a:t>1/25/2018</a:t>
             </a:fld>
             <a:endParaRPr lang="en-US"/>
           </a:p>
@@ -1445,7 +1530,7 @@
           <a:p>
             <a:fld id="{D4E819DD-013E-4DBF-AC13-153FC4836066}" type="datetimeFigureOut">
               <a:rPr lang="en-US" smtClean="0"/>
-              <a:t>12/19/2017</a:t>
+              <a:t>1/25/2018</a:t>
             </a:fld>
             <a:endParaRPr lang="en-US"/>
           </a:p>
@@ -1643,7 +1728,7 @@
           <a:p>
             <a:fld id="{D4E819DD-013E-4DBF-AC13-153FC4836066}" type="datetimeFigureOut">
               <a:rPr lang="en-US" smtClean="0"/>
-              <a:t>12/19/2017</a:t>
+              <a:t>1/25/2018</a:t>
             </a:fld>
             <a:endParaRPr lang="en-US"/>
           </a:p>
@@ -1918,7 +2003,7 @@
           <a:p>
             <a:fld id="{D4E819DD-013E-4DBF-AC13-153FC4836066}" type="datetimeFigureOut">
               <a:rPr lang="en-US" smtClean="0"/>
-              <a:t>12/19/2017</a:t>
+              <a:t>1/25/2018</a:t>
             </a:fld>
             <a:endParaRPr lang="en-US"/>
           </a:p>
@@ -2183,7 +2268,7 @@
           <a:p>
             <a:fld id="{D4E819DD-013E-4DBF-AC13-153FC4836066}" type="datetimeFigureOut">
               <a:rPr lang="en-US" smtClean="0"/>
-              <a:t>12/19/2017</a:t>
+              <a:t>1/25/2018</a:t>
             </a:fld>
             <a:endParaRPr lang="en-US"/>
           </a:p>
@@ -2595,7 +2680,7 @@
           <a:p>
             <a:fld id="{D4E819DD-013E-4DBF-AC13-153FC4836066}" type="datetimeFigureOut">
               <a:rPr lang="en-US" smtClean="0"/>
-              <a:t>12/19/2017</a:t>
+              <a:t>1/25/2018</a:t>
             </a:fld>
             <a:endParaRPr lang="en-US"/>
           </a:p>
@@ -2736,7 +2821,7 @@
           <a:p>
             <a:fld id="{D4E819DD-013E-4DBF-AC13-153FC4836066}" type="datetimeFigureOut">
               <a:rPr lang="en-US" smtClean="0"/>
-              <a:t>12/19/2017</a:t>
+              <a:t>1/25/2018</a:t>
             </a:fld>
             <a:endParaRPr lang="en-US"/>
           </a:p>
@@ -2849,7 +2934,7 @@
           <a:p>
             <a:fld id="{D4E819DD-013E-4DBF-AC13-153FC4836066}" type="datetimeFigureOut">
               <a:rPr lang="en-US" smtClean="0"/>
-              <a:t>12/19/2017</a:t>
+              <a:t>1/25/2018</a:t>
             </a:fld>
             <a:endParaRPr lang="en-US"/>
           </a:p>
@@ -3160,7 +3245,7 @@
           <a:p>
             <a:fld id="{D4E819DD-013E-4DBF-AC13-153FC4836066}" type="datetimeFigureOut">
               <a:rPr lang="en-US" smtClean="0"/>
-              <a:t>12/19/2017</a:t>
+              <a:t>1/25/2018</a:t>
             </a:fld>
             <a:endParaRPr lang="en-US"/>
           </a:p>
@@ -3448,7 +3533,7 @@
           <a:p>
             <a:fld id="{D4E819DD-013E-4DBF-AC13-153FC4836066}" type="datetimeFigureOut">
               <a:rPr lang="en-US" smtClean="0"/>
-              <a:t>12/19/2017</a:t>
+              <a:t>1/25/2018</a:t>
             </a:fld>
             <a:endParaRPr lang="en-US"/>
           </a:p>
@@ -3689,7 +3774,7 @@
           <a:p>
             <a:fld id="{D4E819DD-013E-4DBF-AC13-153FC4836066}" type="datetimeFigureOut">
               <a:rPr lang="en-US" smtClean="0"/>
-              <a:t>12/19/2017</a:t>
+              <a:t>1/25/2018</a:t>
             </a:fld>
             <a:endParaRPr lang="en-US"/>
           </a:p>
@@ -6556,6 +6641,345 @@
 </file>
 
 <file path=ppt/slides/slide5.xml><?xml version="1.0" encoding="utf-8"?>
+<p:sld xmlns:a="http://schemas.openxmlformats.org/drawingml/2006/main" xmlns:r="http://schemas.openxmlformats.org/officeDocument/2006/relationships" xmlns:p="http://schemas.openxmlformats.org/presentationml/2006/main">
+  <p:cSld>
+    <p:spTree>
+      <p:nvGrpSpPr>
+        <p:cNvPr id="1" name=""/>
+        <p:cNvGrpSpPr/>
+        <p:nvPr/>
+      </p:nvGrpSpPr>
+      <p:grpSpPr>
+        <a:xfrm>
+          <a:off x="0" y="0"/>
+          <a:ext cx="0" cy="0"/>
+          <a:chOff x="0" y="0"/>
+          <a:chExt cx="0" cy="0"/>
+        </a:xfrm>
+      </p:grpSpPr>
+      <p:pic>
+        <p:nvPicPr>
+          <p:cNvPr id="2" name="Picture 1">
+            <a:extLst>
+              <a:ext uri="{FF2B5EF4-FFF2-40B4-BE49-F238E27FC236}">
+                <a16:creationId xmlns:a16="http://schemas.microsoft.com/office/drawing/2014/main" id="{35E5672E-909F-4A9E-9DD9-2F7B582F998F}"/>
+              </a:ext>
+            </a:extLst>
+          </p:cNvPr>
+          <p:cNvPicPr>
+            <a:picLocks noChangeAspect="1"/>
+          </p:cNvPicPr>
+          <p:nvPr/>
+        </p:nvPicPr>
+        <p:blipFill rotWithShape="1">
+          <a:blip r:embed="rId3"/>
+          <a:srcRect l="27934" t="22284" r="29171" b="19428"/>
+          <a:stretch/>
+        </p:blipFill>
+        <p:spPr>
+          <a:xfrm>
+            <a:off x="3856653" y="2329197"/>
+            <a:ext cx="2052553" cy="3294051"/>
+          </a:xfrm>
+          <a:prstGeom prst="rect">
+            <a:avLst/>
+          </a:prstGeom>
+        </p:spPr>
+      </p:pic>
+      <p:sp>
+        <p:nvSpPr>
+          <p:cNvPr id="3" name="Arrow: Right 2">
+            <a:extLst>
+              <a:ext uri="{FF2B5EF4-FFF2-40B4-BE49-F238E27FC236}">
+                <a16:creationId xmlns:a16="http://schemas.microsoft.com/office/drawing/2014/main" id="{62C486B7-E42D-4521-9242-695087D8EBCB}"/>
+              </a:ext>
+            </a:extLst>
+          </p:cNvPr>
+          <p:cNvSpPr/>
+          <p:nvPr/>
+        </p:nvSpPr>
+        <p:spPr>
+          <a:xfrm rot="10800000">
+            <a:off x="5090967" y="4549949"/>
+            <a:ext cx="191278" cy="191282"/>
+          </a:xfrm>
+          <a:prstGeom prst="rightArrow">
+            <a:avLst/>
+          </a:prstGeom>
+          <a:solidFill>
+            <a:srgbClr val="FFFF00"/>
+          </a:solidFill>
+          <a:ln>
+            <a:noFill/>
+          </a:ln>
+        </p:spPr>
+        <p:style>
+          <a:lnRef idx="2">
+            <a:schemeClr val="accent1">
+              <a:shade val="50000"/>
+            </a:schemeClr>
+          </a:lnRef>
+          <a:fillRef idx="1">
+            <a:schemeClr val="accent1"/>
+          </a:fillRef>
+          <a:effectRef idx="0">
+            <a:schemeClr val="accent1"/>
+          </a:effectRef>
+          <a:fontRef idx="minor">
+            <a:schemeClr val="lt1"/>
+          </a:fontRef>
+        </p:style>
+        <p:txBody>
+          <a:bodyPr rtlCol="0" anchor="ctr"/>
+          <a:lstStyle/>
+          <a:p>
+            <a:pPr algn="ctr"/>
+            <a:endParaRPr lang="en-US">
+              <a:solidFill>
+                <a:srgbClr val="FFFF00"/>
+              </a:solidFill>
+            </a:endParaRPr>
+          </a:p>
+        </p:txBody>
+      </p:sp>
+      <p:sp>
+        <p:nvSpPr>
+          <p:cNvPr id="4" name="Arrow: Right 3">
+            <a:extLst>
+              <a:ext uri="{FF2B5EF4-FFF2-40B4-BE49-F238E27FC236}">
+                <a16:creationId xmlns:a16="http://schemas.microsoft.com/office/drawing/2014/main" id="{04686C55-A323-4C06-BB54-FFFF7889BA05}"/>
+              </a:ext>
+            </a:extLst>
+          </p:cNvPr>
+          <p:cNvSpPr/>
+          <p:nvPr/>
+        </p:nvSpPr>
+        <p:spPr>
+          <a:xfrm rot="2439065">
+            <a:off x="4480530" y="3522868"/>
+            <a:ext cx="191278" cy="191282"/>
+          </a:xfrm>
+          <a:prstGeom prst="rightArrow">
+            <a:avLst/>
+          </a:prstGeom>
+          <a:solidFill>
+            <a:srgbClr val="FFFF00"/>
+          </a:solidFill>
+          <a:ln>
+            <a:noFill/>
+          </a:ln>
+        </p:spPr>
+        <p:style>
+          <a:lnRef idx="2">
+            <a:schemeClr val="accent1">
+              <a:shade val="50000"/>
+            </a:schemeClr>
+          </a:lnRef>
+          <a:fillRef idx="1">
+            <a:schemeClr val="accent1"/>
+          </a:fillRef>
+          <a:effectRef idx="0">
+            <a:schemeClr val="accent1"/>
+          </a:effectRef>
+          <a:fontRef idx="minor">
+            <a:schemeClr val="lt1"/>
+          </a:fontRef>
+        </p:style>
+        <p:txBody>
+          <a:bodyPr rtlCol="0" anchor="ctr"/>
+          <a:lstStyle/>
+          <a:p>
+            <a:pPr algn="ctr"/>
+            <a:endParaRPr lang="en-US">
+              <a:solidFill>
+                <a:srgbClr val="FFFF00"/>
+              </a:solidFill>
+            </a:endParaRPr>
+          </a:p>
+        </p:txBody>
+      </p:sp>
+      <p:sp>
+        <p:nvSpPr>
+          <p:cNvPr id="5" name="Arrow: Right 4">
+            <a:extLst>
+              <a:ext uri="{FF2B5EF4-FFF2-40B4-BE49-F238E27FC236}">
+                <a16:creationId xmlns:a16="http://schemas.microsoft.com/office/drawing/2014/main" id="{E2AC9755-9D72-4EC1-92F3-F273F166C02F}"/>
+              </a:ext>
+            </a:extLst>
+          </p:cNvPr>
+          <p:cNvSpPr/>
+          <p:nvPr/>
+        </p:nvSpPr>
+        <p:spPr>
+          <a:xfrm rot="10800000">
+            <a:off x="4441037" y="4549949"/>
+            <a:ext cx="191278" cy="191282"/>
+          </a:xfrm>
+          <a:prstGeom prst="rightArrow">
+            <a:avLst/>
+          </a:prstGeom>
+          <a:solidFill>
+            <a:srgbClr val="FFFF00"/>
+          </a:solidFill>
+          <a:ln>
+            <a:noFill/>
+          </a:ln>
+        </p:spPr>
+        <p:style>
+          <a:lnRef idx="2">
+            <a:schemeClr val="accent1">
+              <a:shade val="50000"/>
+            </a:schemeClr>
+          </a:lnRef>
+          <a:fillRef idx="1">
+            <a:schemeClr val="accent1"/>
+          </a:fillRef>
+          <a:effectRef idx="0">
+            <a:schemeClr val="accent1"/>
+          </a:effectRef>
+          <a:fontRef idx="minor">
+            <a:schemeClr val="lt1"/>
+          </a:fontRef>
+        </p:style>
+        <p:txBody>
+          <a:bodyPr rtlCol="0" anchor="ctr"/>
+          <a:lstStyle/>
+          <a:p>
+            <a:pPr algn="ctr"/>
+            <a:endParaRPr lang="en-US">
+              <a:solidFill>
+                <a:srgbClr val="FFFF00"/>
+              </a:solidFill>
+            </a:endParaRPr>
+          </a:p>
+        </p:txBody>
+      </p:sp>
+      <p:sp>
+        <p:nvSpPr>
+          <p:cNvPr id="6" name="Arrow: Right 5">
+            <a:extLst>
+              <a:ext uri="{FF2B5EF4-FFF2-40B4-BE49-F238E27FC236}">
+                <a16:creationId xmlns:a16="http://schemas.microsoft.com/office/drawing/2014/main" id="{2BBB08E6-1976-44A3-B78B-7C52230CEF28}"/>
+              </a:ext>
+            </a:extLst>
+          </p:cNvPr>
+          <p:cNvSpPr/>
+          <p:nvPr/>
+        </p:nvSpPr>
+        <p:spPr>
+          <a:xfrm rot="2439065">
+            <a:off x="5138599" y="4191563"/>
+            <a:ext cx="191278" cy="191282"/>
+          </a:xfrm>
+          <a:prstGeom prst="rightArrow">
+            <a:avLst/>
+          </a:prstGeom>
+          <a:solidFill>
+            <a:srgbClr val="FFFF00"/>
+          </a:solidFill>
+          <a:ln>
+            <a:noFill/>
+          </a:ln>
+        </p:spPr>
+        <p:style>
+          <a:lnRef idx="2">
+            <a:schemeClr val="accent1">
+              <a:shade val="50000"/>
+            </a:schemeClr>
+          </a:lnRef>
+          <a:fillRef idx="1">
+            <a:schemeClr val="accent1"/>
+          </a:fillRef>
+          <a:effectRef idx="0">
+            <a:schemeClr val="accent1"/>
+          </a:effectRef>
+          <a:fontRef idx="minor">
+            <a:schemeClr val="lt1"/>
+          </a:fontRef>
+        </p:style>
+        <p:txBody>
+          <a:bodyPr rtlCol="0" anchor="ctr"/>
+          <a:lstStyle/>
+          <a:p>
+            <a:pPr algn="ctr"/>
+            <a:endParaRPr lang="en-US">
+              <a:solidFill>
+                <a:srgbClr val="FFFF00"/>
+              </a:solidFill>
+            </a:endParaRPr>
+          </a:p>
+        </p:txBody>
+      </p:sp>
+      <p:sp>
+        <p:nvSpPr>
+          <p:cNvPr id="7" name="Arrow: Right 6">
+            <a:extLst>
+              <a:ext uri="{FF2B5EF4-FFF2-40B4-BE49-F238E27FC236}">
+                <a16:creationId xmlns:a16="http://schemas.microsoft.com/office/drawing/2014/main" id="{F419AD58-C67B-4879-8E03-83E230B6D2B3}"/>
+              </a:ext>
+            </a:extLst>
+          </p:cNvPr>
+          <p:cNvSpPr/>
+          <p:nvPr/>
+        </p:nvSpPr>
+        <p:spPr>
+          <a:xfrm rot="16200000">
+            <a:off x="4097975" y="4191563"/>
+            <a:ext cx="191278" cy="191282"/>
+          </a:xfrm>
+          <a:prstGeom prst="rightArrow">
+            <a:avLst/>
+          </a:prstGeom>
+          <a:solidFill>
+            <a:srgbClr val="FFFF00"/>
+          </a:solidFill>
+          <a:ln>
+            <a:noFill/>
+          </a:ln>
+        </p:spPr>
+        <p:style>
+          <a:lnRef idx="2">
+            <a:schemeClr val="accent1">
+              <a:shade val="50000"/>
+            </a:schemeClr>
+          </a:lnRef>
+          <a:fillRef idx="1">
+            <a:schemeClr val="accent1"/>
+          </a:fillRef>
+          <a:effectRef idx="0">
+            <a:schemeClr val="accent1"/>
+          </a:effectRef>
+          <a:fontRef idx="minor">
+            <a:schemeClr val="lt1"/>
+          </a:fontRef>
+        </p:style>
+        <p:txBody>
+          <a:bodyPr rtlCol="0" anchor="ctr"/>
+          <a:lstStyle/>
+          <a:p>
+            <a:pPr algn="ctr"/>
+            <a:endParaRPr lang="en-US">
+              <a:solidFill>
+                <a:srgbClr val="FFFF00"/>
+              </a:solidFill>
+            </a:endParaRPr>
+          </a:p>
+        </p:txBody>
+      </p:sp>
+    </p:spTree>
+    <p:extLst>
+      <p:ext uri="{BB962C8B-B14F-4D97-AF65-F5344CB8AC3E}">
+        <p14:creationId xmlns:p14="http://schemas.microsoft.com/office/powerpoint/2010/main" val="2197273077"/>
+      </p:ext>
+    </p:extLst>
+  </p:cSld>
+  <p:clrMapOvr>
+    <a:masterClrMapping/>
+  </p:clrMapOvr>
+</p:sld>
+</file>
+
+<file path=ppt/slides/slide6.xml><?xml version="1.0" encoding="utf-8"?>
 <p:sld xmlns:a="http://schemas.openxmlformats.org/drawingml/2006/main" xmlns:r="http://schemas.openxmlformats.org/officeDocument/2006/relationships" xmlns:p="http://schemas.openxmlformats.org/presentationml/2006/main">
   <p:cSld>
     <p:spTree>

</xml_diff>